<commit_message>
Update entire project to follow better software engineering practices
</commit_message>
<xml_diff>
--- a/docs/diagrams/UiComponentClassDiagram.pptx
+++ b/docs/diagrams/UiComponentClassDiagram.pptx
@@ -208,7 +208,7 @@
           <a:p>
             <a:fld id="{F5CC4B3F-88C1-4FFA-B1B6-F41C21DC6924}" type="datetimeFigureOut">
               <a:rPr lang="en-US" smtClean="0"/>
-              <a:t>3/25/2019</a:t>
+              <a:t>3/27/2019</a:t>
             </a:fld>
             <a:endParaRPr lang="en-US"/>
           </a:p>
@@ -738,7 +738,7 @@
           <a:p>
             <a:fld id="{78C97017-6FC3-485B-9764-EAC9E56C1D49}" type="datetimeFigureOut">
               <a:rPr lang="en-US" smtClean="0"/>
-              <a:t>3/25/2019</a:t>
+              <a:t>3/27/2019</a:t>
             </a:fld>
             <a:endParaRPr lang="en-US"/>
           </a:p>
@@ -906,7 +906,7 @@
           <a:p>
             <a:fld id="{78C97017-6FC3-485B-9764-EAC9E56C1D49}" type="datetimeFigureOut">
               <a:rPr lang="en-US" smtClean="0"/>
-              <a:t>3/25/2019</a:t>
+              <a:t>3/27/2019</a:t>
             </a:fld>
             <a:endParaRPr lang="en-US"/>
           </a:p>
@@ -1084,7 +1084,7 @@
           <a:p>
             <a:fld id="{78C97017-6FC3-485B-9764-EAC9E56C1D49}" type="datetimeFigureOut">
               <a:rPr lang="en-US" smtClean="0"/>
-              <a:t>3/25/2019</a:t>
+              <a:t>3/27/2019</a:t>
             </a:fld>
             <a:endParaRPr lang="en-US"/>
           </a:p>
@@ -1252,7 +1252,7 @@
           <a:p>
             <a:fld id="{78C97017-6FC3-485B-9764-EAC9E56C1D49}" type="datetimeFigureOut">
               <a:rPr lang="en-US" smtClean="0"/>
-              <a:t>3/25/2019</a:t>
+              <a:t>3/27/2019</a:t>
             </a:fld>
             <a:endParaRPr lang="en-US"/>
           </a:p>
@@ -1497,7 +1497,7 @@
           <a:p>
             <a:fld id="{78C97017-6FC3-485B-9764-EAC9E56C1D49}" type="datetimeFigureOut">
               <a:rPr lang="en-US" smtClean="0"/>
-              <a:t>3/25/2019</a:t>
+              <a:t>3/27/2019</a:t>
             </a:fld>
             <a:endParaRPr lang="en-US"/>
           </a:p>
@@ -1782,7 +1782,7 @@
           <a:p>
             <a:fld id="{78C97017-6FC3-485B-9764-EAC9E56C1D49}" type="datetimeFigureOut">
               <a:rPr lang="en-US" smtClean="0"/>
-              <a:t>3/25/2019</a:t>
+              <a:t>3/27/2019</a:t>
             </a:fld>
             <a:endParaRPr lang="en-US"/>
           </a:p>
@@ -2201,7 +2201,7 @@
           <a:p>
             <a:fld id="{78C97017-6FC3-485B-9764-EAC9E56C1D49}" type="datetimeFigureOut">
               <a:rPr lang="en-US" smtClean="0"/>
-              <a:t>3/25/2019</a:t>
+              <a:t>3/27/2019</a:t>
             </a:fld>
             <a:endParaRPr lang="en-US"/>
           </a:p>
@@ -2318,7 +2318,7 @@
           <a:p>
             <a:fld id="{78C97017-6FC3-485B-9764-EAC9E56C1D49}" type="datetimeFigureOut">
               <a:rPr lang="en-US" smtClean="0"/>
-              <a:t>3/25/2019</a:t>
+              <a:t>3/27/2019</a:t>
             </a:fld>
             <a:endParaRPr lang="en-US"/>
           </a:p>
@@ -2413,7 +2413,7 @@
           <a:p>
             <a:fld id="{78C97017-6FC3-485B-9764-EAC9E56C1D49}" type="datetimeFigureOut">
               <a:rPr lang="en-US" smtClean="0"/>
-              <a:t>3/25/2019</a:t>
+              <a:t>3/27/2019</a:t>
             </a:fld>
             <a:endParaRPr lang="en-US"/>
           </a:p>
@@ -2688,7 +2688,7 @@
           <a:p>
             <a:fld id="{78C97017-6FC3-485B-9764-EAC9E56C1D49}" type="datetimeFigureOut">
               <a:rPr lang="en-US" smtClean="0"/>
-              <a:t>3/25/2019</a:t>
+              <a:t>3/27/2019</a:t>
             </a:fld>
             <a:endParaRPr lang="en-US"/>
           </a:p>
@@ -2940,7 +2940,7 @@
           <a:p>
             <a:fld id="{78C97017-6FC3-485B-9764-EAC9E56C1D49}" type="datetimeFigureOut">
               <a:rPr lang="en-US" smtClean="0"/>
-              <a:t>3/25/2019</a:t>
+              <a:t>3/27/2019</a:t>
             </a:fld>
             <a:endParaRPr lang="en-US"/>
           </a:p>
@@ -3151,7 +3151,7 @@
           <a:p>
             <a:fld id="{78C97017-6FC3-485B-9764-EAC9E56C1D49}" type="datetimeFigureOut">
               <a:rPr lang="en-US" smtClean="0"/>
-              <a:t>3/25/2019</a:t>
+              <a:t>3/27/2019</a:t>
             </a:fld>
             <a:endParaRPr lang="en-US"/>
           </a:p>
@@ -3535,7 +3535,7 @@
         <p:spPr>
           <a:xfrm>
             <a:off x="1752600" y="1447800"/>
-            <a:ext cx="2286000" cy="2286000"/>
+            <a:ext cx="1731314" cy="1447800"/>
           </a:xfrm>
           <a:prstGeom prst="roundRect">
             <a:avLst>
@@ -3637,66 +3637,6 @@
                 </a:solidFill>
               </a:rPr>
               <a:t>MainWindow</a:t>
-            </a:r>
-            <a:endParaRPr lang="en-SG" sz="1050" b="1" dirty="0">
-              <a:solidFill>
-                <a:schemeClr val="accent3">
-                  <a:lumMod val="75000"/>
-                </a:schemeClr>
-              </a:solidFill>
-            </a:endParaRPr>
-          </a:p>
-        </p:txBody>
-      </p:sp>
-      <p:sp>
-        <p:nvSpPr>
-          <p:cNvPr id="3" name="Rectangle 11"/>
-          <p:cNvSpPr/>
-          <p:nvPr/>
-        </p:nvSpPr>
-        <p:spPr>
-          <a:xfrm>
-            <a:off x="2592528" y="2971800"/>
-            <a:ext cx="1093635" cy="236841"/>
-          </a:xfrm>
-          <a:prstGeom prst="rect">
-            <a:avLst/>
-          </a:prstGeom>
-          <a:ln w="19050">
-            <a:solidFill>
-              <a:schemeClr val="accent3"/>
-            </a:solidFill>
-          </a:ln>
-          <a:effectLst/>
-        </p:spPr>
-        <p:style>
-          <a:lnRef idx="1">
-            <a:schemeClr val="accent3"/>
-          </a:lnRef>
-          <a:fillRef idx="2">
-            <a:schemeClr val="accent3"/>
-          </a:fillRef>
-          <a:effectRef idx="1">
-            <a:schemeClr val="accent3"/>
-          </a:effectRef>
-          <a:fontRef idx="minor">
-            <a:schemeClr val="dk1"/>
-          </a:fontRef>
-        </p:style>
-        <p:txBody>
-          <a:bodyPr rtlCol="0" anchor="ctr"/>
-          <a:lstStyle/>
-          <a:p>
-            <a:pPr algn="ctr"/>
-            <a:r>
-              <a:rPr lang="en-US" sz="1050" b="1" dirty="0" err="1">
-                <a:solidFill>
-                  <a:schemeClr val="accent3">
-                    <a:lumMod val="75000"/>
-                  </a:schemeClr>
-                </a:solidFill>
-              </a:rPr>
-              <a:t>CommandBox</a:t>
             </a:r>
             <a:endParaRPr lang="en-SG" sz="1050" b="1" dirty="0">
               <a:solidFill>
@@ -3771,6 +3711,7 @@
         <p:nvCxnSpPr>
           <p:cNvPr id="10" name="Elbow Connector 63"/>
           <p:cNvCxnSpPr>
+            <a:cxnSpLocks/>
             <a:stCxn id="9" idx="2"/>
             <a:endCxn id="2" idx="0"/>
           </p:cNvCxnSpPr>
@@ -3818,16 +3759,16 @@
         </p:nvSpPr>
         <p:spPr>
           <a:xfrm rot="16200000">
-            <a:off x="4013816" y="1780281"/>
-            <a:ext cx="1058097" cy="328045"/>
+            <a:off x="3571230" y="2023850"/>
+            <a:ext cx="833898" cy="328045"/>
           </a:xfrm>
           <a:prstGeom prst="roundRect">
             <a:avLst/>
           </a:prstGeom>
           <a:solidFill>
             <a:schemeClr val="accent1">
-              <a:lumMod val="20000"/>
-              <a:lumOff val="80000"/>
+              <a:lumMod val="40000"/>
+              <a:lumOff val="60000"/>
             </a:schemeClr>
           </a:solidFill>
           <a:ln w="19050">
@@ -3870,171 +3811,24 @@
           </a:p>
         </p:txBody>
       </p:sp>
-      <p:sp>
-        <p:nvSpPr>
-          <p:cNvPr id="39" name="Flowchart: Decision 38"/>
-          <p:cNvSpPr/>
-          <p:nvPr/>
-        </p:nvSpPr>
-        <p:spPr>
-          <a:xfrm>
-            <a:off x="2324548" y="2706452"/>
-            <a:ext cx="183156" cy="161573"/>
-          </a:xfrm>
-          <a:prstGeom prst="flowChartDecision">
-            <a:avLst/>
-          </a:prstGeom>
-          <a:solidFill>
-            <a:schemeClr val="accent3"/>
-          </a:solidFill>
-          <a:ln>
-            <a:solidFill>
-              <a:schemeClr val="accent3"/>
-            </a:solidFill>
-          </a:ln>
-        </p:spPr>
-        <p:style>
-          <a:lnRef idx="2">
-            <a:schemeClr val="accent1">
-              <a:shade val="50000"/>
-            </a:schemeClr>
-          </a:lnRef>
-          <a:fillRef idx="1">
-            <a:schemeClr val="accent1"/>
-          </a:fillRef>
-          <a:effectRef idx="0">
-            <a:schemeClr val="accent1"/>
-          </a:effectRef>
-          <a:fontRef idx="minor">
-            <a:schemeClr val="lt1"/>
-          </a:fontRef>
-        </p:style>
-        <p:txBody>
-          <a:bodyPr rtlCol="0" anchor="ctr"/>
-          <a:lstStyle/>
-          <a:p>
-            <a:pPr algn="ctr"/>
-            <a:endParaRPr lang="en-SG"/>
-          </a:p>
-        </p:txBody>
-      </p:sp>
-      <p:cxnSp>
-        <p:nvCxnSpPr>
-          <p:cNvPr id="40" name="Elbow Connector 63"/>
-          <p:cNvCxnSpPr>
-            <a:stCxn id="39" idx="2"/>
-            <a:endCxn id="3" idx="1"/>
-          </p:cNvCxnSpPr>
-          <p:nvPr/>
-        </p:nvCxnSpPr>
-        <p:spPr>
-          <a:xfrm rot="16200000" flipH="1">
-            <a:off x="2393229" y="2890922"/>
-            <a:ext cx="222196" cy="176402"/>
-          </a:xfrm>
-          <a:prstGeom prst="bentConnector2">
-            <a:avLst/>
-          </a:prstGeom>
-          <a:ln w="19050">
-            <a:solidFill>
-              <a:schemeClr val="accent3"/>
-            </a:solidFill>
-            <a:headEnd type="none" w="med" len="med"/>
-            <a:tailEnd type="arrow" w="med" len="med"/>
-          </a:ln>
-          <a:effectLst/>
-        </p:spPr>
-        <p:style>
-          <a:lnRef idx="1">
-            <a:schemeClr val="accent2"/>
-          </a:lnRef>
-          <a:fillRef idx="2">
-            <a:schemeClr val="accent2"/>
-          </a:fillRef>
-          <a:effectRef idx="1">
-            <a:schemeClr val="accent2"/>
-          </a:effectRef>
-          <a:fontRef idx="minor">
-            <a:schemeClr val="dk1"/>
-          </a:fontRef>
-        </p:style>
-      </p:cxnSp>
-      <p:sp>
-        <p:nvSpPr>
-          <p:cNvPr id="43" name="Rectangle 11"/>
-          <p:cNvSpPr/>
-          <p:nvPr/>
-        </p:nvSpPr>
-        <p:spPr>
-          <a:xfrm>
-            <a:off x="2590799" y="3304308"/>
-            <a:ext cx="1095361" cy="236841"/>
-          </a:xfrm>
-          <a:prstGeom prst="rect">
-            <a:avLst/>
-          </a:prstGeom>
-          <a:ln w="19050">
-            <a:solidFill>
-              <a:schemeClr val="accent3"/>
-            </a:solidFill>
-          </a:ln>
-          <a:effectLst/>
-        </p:spPr>
-        <p:style>
-          <a:lnRef idx="1">
-            <a:schemeClr val="accent3"/>
-          </a:lnRef>
-          <a:fillRef idx="2">
-            <a:schemeClr val="accent3"/>
-          </a:fillRef>
-          <a:effectRef idx="1">
-            <a:schemeClr val="accent3"/>
-          </a:effectRef>
-          <a:fontRef idx="minor">
-            <a:schemeClr val="dk1"/>
-          </a:fontRef>
-        </p:style>
-        <p:txBody>
-          <a:bodyPr rtlCol="0" anchor="ctr"/>
-          <a:lstStyle/>
-          <a:p>
-            <a:pPr algn="ctr"/>
-            <a:r>
-              <a:rPr lang="en-US" sz="1050" b="1" dirty="0" err="1">
-                <a:solidFill>
-                  <a:schemeClr val="accent3">
-                    <a:lumMod val="75000"/>
-                  </a:schemeClr>
-                </a:solidFill>
-              </a:rPr>
-              <a:t>ResultDisplay</a:t>
-            </a:r>
-            <a:endParaRPr lang="en-SG" sz="1050" b="1" dirty="0">
-              <a:solidFill>
-                <a:schemeClr val="accent3">
-                  <a:lumMod val="75000"/>
-                </a:schemeClr>
-              </a:solidFill>
-            </a:endParaRPr>
-          </a:p>
-        </p:txBody>
-      </p:sp>
       <p:cxnSp>
         <p:nvCxnSpPr>
           <p:cNvPr id="107" name="Elbow Connector 106"/>
           <p:cNvCxnSpPr>
             <a:cxnSpLocks/>
-            <a:stCxn id="9" idx="0"/>
+            <a:stCxn id="9" idx="3"/>
           </p:cNvCxnSpPr>
           <p:nvPr/>
         </p:nvCxnSpPr>
         <p:spPr>
-          <a:xfrm rot="5400000" flipH="1" flipV="1">
-            <a:off x="3425286" y="825236"/>
-            <a:ext cx="160062" cy="1731314"/>
+          <a:xfrm>
+            <a:off x="3186477" y="1944304"/>
+            <a:ext cx="637681" cy="18675"/>
           </a:xfrm>
-          <a:prstGeom prst="bentConnector2">
-            <a:avLst/>
+          <a:prstGeom prst="bentConnector3">
+            <a:avLst>
+              <a:gd name="adj1" fmla="val 336"/>
+            </a:avLst>
           </a:prstGeom>
           <a:ln w="19050">
             <a:solidFill>
@@ -4063,97 +3857,32 @@
       </p:cxnSp>
       <p:cxnSp>
         <p:nvCxnSpPr>
-          <p:cNvPr id="131" name="Elbow Connector 130"/>
+          <p:cNvPr id="17" name="Elbow Connector 106">
+            <a:extLst>
+              <a:ext uri="{FF2B5EF4-FFF2-40B4-BE49-F238E27FC236}">
+                <a16:creationId xmlns:a16="http://schemas.microsoft.com/office/drawing/2014/main" id="{5CDA83B6-8324-4EE0-BE81-B27B288BE169}"/>
+              </a:ext>
+            </a:extLst>
+          </p:cNvPr>
           <p:cNvCxnSpPr>
-            <a:stCxn id="39" idx="2"/>
-            <a:endCxn id="43" idx="1"/>
+            <a:cxnSpLocks/>
+            <a:stCxn id="2" idx="3"/>
           </p:cNvCxnSpPr>
           <p:nvPr/>
         </p:nvCxnSpPr>
         <p:spPr>
-          <a:xfrm rot="16200000" flipH="1">
-            <a:off x="2226110" y="3058040"/>
-            <a:ext cx="554704" cy="174673"/>
+          <a:xfrm flipV="1">
+            <a:off x="3189583" y="2250672"/>
+            <a:ext cx="634575" cy="263928"/>
           </a:xfrm>
-          <a:prstGeom prst="bentConnector2">
-            <a:avLst/>
+          <a:prstGeom prst="bentConnector3">
+            <a:avLst>
+              <a:gd name="adj1" fmla="val 50000"/>
+            </a:avLst>
           </a:prstGeom>
           <a:ln w="19050">
             <a:solidFill>
-              <a:schemeClr val="accent3"/>
-            </a:solidFill>
-            <a:headEnd type="none" w="med" len="med"/>
-            <a:tailEnd type="arrow" w="med" len="med"/>
-          </a:ln>
-          <a:effectLst/>
-        </p:spPr>
-        <p:style>
-          <a:lnRef idx="1">
-            <a:schemeClr val="accent2"/>
-          </a:lnRef>
-          <a:fillRef idx="2">
-            <a:schemeClr val="accent2"/>
-          </a:fillRef>
-          <a:effectRef idx="1">
-            <a:schemeClr val="accent2"/>
-          </a:effectRef>
-          <a:fontRef idx="minor">
-            <a:schemeClr val="dk1"/>
-          </a:fontRef>
-        </p:style>
-      </p:cxnSp>
-      <p:sp>
-        <p:nvSpPr>
-          <p:cNvPr id="116" name="Freeform 115"/>
-          <p:cNvSpPr/>
-          <p:nvPr/>
-        </p:nvSpPr>
-        <p:spPr>
-          <a:xfrm>
-            <a:off x="3186477" y="2054745"/>
-            <a:ext cx="1184497" cy="396656"/>
-          </a:xfrm>
-          <a:custGeom>
-            <a:avLst/>
-            <a:gdLst>
-              <a:gd name="connsiteX0" fmla="*/ 0 w 3048000"/>
-              <a:gd name="connsiteY0" fmla="*/ 203200 h 203200"/>
-              <a:gd name="connsiteX1" fmla="*/ 221673 w 3048000"/>
-              <a:gd name="connsiteY1" fmla="*/ 0 h 203200"/>
-              <a:gd name="connsiteX2" fmla="*/ 3048000 w 3048000"/>
-              <a:gd name="connsiteY2" fmla="*/ 0 h 203200"/>
-            </a:gdLst>
-            <a:ahLst/>
-            <a:cxnLst>
-              <a:cxn ang="0">
-                <a:pos x="connsiteX0" y="connsiteY0"/>
-              </a:cxn>
-              <a:cxn ang="0">
-                <a:pos x="connsiteX1" y="connsiteY1"/>
-              </a:cxn>
-              <a:cxn ang="0">
-                <a:pos x="connsiteX2" y="connsiteY2"/>
-              </a:cxn>
-            </a:cxnLst>
-            <a:rect l="l" t="t" r="r" b="b"/>
-            <a:pathLst>
-              <a:path w="3048000" h="203200">
-                <a:moveTo>
-                  <a:pt x="0" y="203200"/>
-                </a:moveTo>
-                <a:lnTo>
-                  <a:pt x="221673" y="0"/>
-                </a:lnTo>
-                <a:lnTo>
-                  <a:pt x="3048000" y="0"/>
-                </a:lnTo>
-              </a:path>
-            </a:pathLst>
-          </a:custGeom>
-          <a:noFill/>
-          <a:ln w="19050">
-            <a:solidFill>
-              <a:schemeClr val="accent3"/>
+              <a:srgbClr val="00B050"/>
             </a:solidFill>
             <a:prstDash val="solid"/>
             <a:headEnd type="none" w="med" len="med"/>
@@ -4175,12 +3904,70 @@
             <a:schemeClr val="dk1"/>
           </a:fontRef>
         </p:style>
+      </p:cxnSp>
+      <p:sp>
+        <p:nvSpPr>
+          <p:cNvPr id="21" name="Rectangle 65">
+            <a:extLst>
+              <a:ext uri="{FF2B5EF4-FFF2-40B4-BE49-F238E27FC236}">
+                <a16:creationId xmlns:a16="http://schemas.microsoft.com/office/drawing/2014/main" id="{02DF521E-7E36-4825-A42A-868FD34A265B}"/>
+              </a:ext>
+            </a:extLst>
+          </p:cNvPr>
+          <p:cNvSpPr/>
+          <p:nvPr/>
+        </p:nvSpPr>
+        <p:spPr>
+          <a:xfrm rot="16200000">
+            <a:off x="4282904" y="2025779"/>
+            <a:ext cx="830039" cy="328045"/>
+          </a:xfrm>
+          <a:prstGeom prst="roundRect">
+            <a:avLst/>
+          </a:prstGeom>
+          <a:solidFill>
+            <a:schemeClr val="accent4">
+              <a:lumMod val="40000"/>
+              <a:lumOff val="60000"/>
+            </a:schemeClr>
+          </a:solidFill>
+          <a:ln w="19050">
+            <a:noFill/>
+          </a:ln>
+          <a:effectLst/>
+        </p:spPr>
+        <p:style>
+          <a:lnRef idx="1">
+            <a:schemeClr val="accent2"/>
+          </a:lnRef>
+          <a:fillRef idx="2">
+            <a:schemeClr val="accent2"/>
+          </a:fillRef>
+          <a:effectRef idx="1">
+            <a:schemeClr val="accent2"/>
+          </a:effectRef>
+          <a:fontRef idx="minor">
+            <a:schemeClr val="dk1"/>
+          </a:fontRef>
+        </p:style>
         <p:txBody>
           <a:bodyPr rtlCol="0" anchor="ctr"/>
           <a:lstStyle/>
           <a:p>
             <a:pPr algn="ctr"/>
-            <a:endParaRPr lang="en-SG"/>
+            <a:r>
+              <a:rPr lang="en-US" sz="1100" b="1" dirty="0">
+                <a:solidFill>
+                  <a:schemeClr val="bg1"/>
+                </a:solidFill>
+              </a:rPr>
+              <a:t>Data</a:t>
+            </a:r>
+            <a:endParaRPr lang="en-SG" sz="1100" b="1" dirty="0">
+              <a:solidFill>
+                <a:schemeClr val="bg1"/>
+              </a:solidFill>
+            </a:endParaRPr>
           </a:p>
         </p:txBody>
       </p:sp>

</xml_diff>